<commit_message>
Finish edit P1C3 for loop concept.
</commit_message>
<xml_diff>
--- a/resources/ppt-slides/control-flow-for-loop-reverse.pptx
+++ b/resources/ppt-slides/control-flow-for-loop-reverse.pptx
@@ -252,7 +252,7 @@
           <a:p>
             <a:fld id="{964302DC-9F53-934F-AE4D-0F1F197008C1}" type="datetimeFigureOut">
               <a:rPr lang="en-US" smtClean="0"/>
-              <a:t>10/19/23</a:t>
+              <a:t>2/9/24</a:t>
             </a:fld>
             <a:endParaRPr lang="en-US"/>
           </a:p>
@@ -422,7 +422,7 @@
           <a:p>
             <a:fld id="{964302DC-9F53-934F-AE4D-0F1F197008C1}" type="datetimeFigureOut">
               <a:rPr lang="en-US" smtClean="0"/>
-              <a:t>10/19/23</a:t>
+              <a:t>2/9/24</a:t>
             </a:fld>
             <a:endParaRPr lang="en-US"/>
           </a:p>
@@ -602,7 +602,7 @@
           <a:p>
             <a:fld id="{964302DC-9F53-934F-AE4D-0F1F197008C1}" type="datetimeFigureOut">
               <a:rPr lang="en-US" smtClean="0"/>
-              <a:t>10/19/23</a:t>
+              <a:t>2/9/24</a:t>
             </a:fld>
             <a:endParaRPr lang="en-US"/>
           </a:p>
@@ -772,7 +772,7 @@
           <a:p>
             <a:fld id="{964302DC-9F53-934F-AE4D-0F1F197008C1}" type="datetimeFigureOut">
               <a:rPr lang="en-US" smtClean="0"/>
-              <a:t>10/19/23</a:t>
+              <a:t>2/9/24</a:t>
             </a:fld>
             <a:endParaRPr lang="en-US"/>
           </a:p>
@@ -1016,7 +1016,7 @@
           <a:p>
             <a:fld id="{964302DC-9F53-934F-AE4D-0F1F197008C1}" type="datetimeFigureOut">
               <a:rPr lang="en-US" smtClean="0"/>
-              <a:t>10/19/23</a:t>
+              <a:t>2/9/24</a:t>
             </a:fld>
             <a:endParaRPr lang="en-US"/>
           </a:p>
@@ -1248,7 +1248,7 @@
           <a:p>
             <a:fld id="{964302DC-9F53-934F-AE4D-0F1F197008C1}" type="datetimeFigureOut">
               <a:rPr lang="en-US" smtClean="0"/>
-              <a:t>10/19/23</a:t>
+              <a:t>2/9/24</a:t>
             </a:fld>
             <a:endParaRPr lang="en-US"/>
           </a:p>
@@ -1615,7 +1615,7 @@
           <a:p>
             <a:fld id="{964302DC-9F53-934F-AE4D-0F1F197008C1}" type="datetimeFigureOut">
               <a:rPr lang="en-US" smtClean="0"/>
-              <a:t>10/19/23</a:t>
+              <a:t>2/9/24</a:t>
             </a:fld>
             <a:endParaRPr lang="en-US"/>
           </a:p>
@@ -1733,7 +1733,7 @@
           <a:p>
             <a:fld id="{964302DC-9F53-934F-AE4D-0F1F197008C1}" type="datetimeFigureOut">
               <a:rPr lang="en-US" smtClean="0"/>
-              <a:t>10/19/23</a:t>
+              <a:t>2/9/24</a:t>
             </a:fld>
             <a:endParaRPr lang="en-US"/>
           </a:p>
@@ -1828,7 +1828,7 @@
           <a:p>
             <a:fld id="{964302DC-9F53-934F-AE4D-0F1F197008C1}" type="datetimeFigureOut">
               <a:rPr lang="en-US" smtClean="0"/>
-              <a:t>10/19/23</a:t>
+              <a:t>2/9/24</a:t>
             </a:fld>
             <a:endParaRPr lang="en-US"/>
           </a:p>
@@ -2105,7 +2105,7 @@
           <a:p>
             <a:fld id="{964302DC-9F53-934F-AE4D-0F1F197008C1}" type="datetimeFigureOut">
               <a:rPr lang="en-US" smtClean="0"/>
-              <a:t>10/19/23</a:t>
+              <a:t>2/9/24</a:t>
             </a:fld>
             <a:endParaRPr lang="en-US"/>
           </a:p>
@@ -2362,7 +2362,7 @@
           <a:p>
             <a:fld id="{964302DC-9F53-934F-AE4D-0F1F197008C1}" type="datetimeFigureOut">
               <a:rPr lang="en-US" smtClean="0"/>
-              <a:t>10/19/23</a:t>
+              <a:t>2/9/24</a:t>
             </a:fld>
             <a:endParaRPr lang="en-US"/>
           </a:p>
@@ -2427,9 +2427,18 @@
 <p:sldMaster xmlns:a="http://schemas.openxmlformats.org/drawingml/2006/main" xmlns:r="http://schemas.openxmlformats.org/officeDocument/2006/relationships" xmlns:p="http://schemas.openxmlformats.org/presentationml/2006/main">
   <p:cSld>
     <p:bg>
-      <p:bgRef idx="1001">
-        <a:schemeClr val="bg1"/>
-      </p:bgRef>
+      <p:bgPr>
+        <a:blipFill dpi="0" rotWithShape="1">
+          <a:blip r:embed="rId13">
+            <a:lum/>
+          </a:blip>
+          <a:srcRect/>
+          <a:stretch>
+            <a:fillRect/>
+          </a:stretch>
+        </a:blipFill>
+        <a:effectLst/>
+      </p:bgPr>
     </p:bg>
     <p:spTree>
       <p:nvGrpSpPr>
@@ -2575,7 +2584,7 @@
           <a:p>
             <a:fld id="{964302DC-9F53-934F-AE4D-0F1F197008C1}" type="datetimeFigureOut">
               <a:rPr lang="en-US" smtClean="0"/>
-              <a:t>10/19/23</a:t>
+              <a:t>2/9/24</a:t>
             </a:fld>
             <a:endParaRPr lang="en-US"/>
           </a:p>
@@ -2966,20 +2975,6 @@
 <file path=ppt/slides/slide1.xml><?xml version="1.0" encoding="utf-8"?>
 <p:sld xmlns:a="http://schemas.openxmlformats.org/drawingml/2006/main" xmlns:r="http://schemas.openxmlformats.org/officeDocument/2006/relationships" xmlns:p="http://schemas.openxmlformats.org/presentationml/2006/main">
   <p:cSld>
-    <p:bg>
-      <p:bgPr>
-        <a:blipFill dpi="0" rotWithShape="1">
-          <a:blip r:embed="rId2">
-            <a:lum/>
-          </a:blip>
-          <a:srcRect/>
-          <a:stretch>
-            <a:fillRect/>
-          </a:stretch>
-        </a:blipFill>
-        <a:effectLst/>
-      </p:bgPr>
-    </p:bg>
     <p:spTree>
       <p:nvGrpSpPr>
         <p:cNvPr id="1" name=""/>
@@ -3090,7 +3085,7 @@
                     </a:schemeClr>
                   </a:solidFill>
                 </a:rPr>
-                <a:t>for(max = ToInt32(</a:t>
+                <a:t>for (max = ToInt32(</a:t>
               </a:r>
               <a:r>
                 <a:rPr lang="en-AU" sz="1600" dirty="0" err="1">
@@ -3142,7 +3137,7 @@
                     </a:schemeClr>
                   </a:solidFill>
                 </a:rPr>
-                <a:t>  WriteLine(max);</a:t>
+                <a:t>    WriteLine(max);</a:t>
               </a:r>
             </a:p>
             <a:p>
@@ -3215,7 +3210,7 @@
               <p:nvPr/>
             </p:nvPicPr>
             <p:blipFill>
-              <a:blip r:embed="rId3">
+              <a:blip r:embed="rId2">
                 <a:alphaModFix amt="30000"/>
               </a:blip>
               <a:stretch>
@@ -5294,7 +5289,7 @@
             <p:nvPr/>
           </p:nvPicPr>
           <p:blipFill>
-            <a:blip r:embed="rId4">
+            <a:blip r:embed="rId3">
               <a:alphaModFix/>
             </a:blip>
             <a:stretch>
@@ -5519,20 +5514,6 @@
 <file path=ppt/slides/slide10.xml><?xml version="1.0" encoding="utf-8"?>
 <p:sld xmlns:a="http://schemas.openxmlformats.org/drawingml/2006/main" xmlns:r="http://schemas.openxmlformats.org/officeDocument/2006/relationships" xmlns:p="http://schemas.openxmlformats.org/presentationml/2006/main">
   <p:cSld>
-    <p:bg>
-      <p:bgPr>
-        <a:blipFill dpi="0" rotWithShape="1">
-          <a:blip r:embed="rId2">
-            <a:lum/>
-          </a:blip>
-          <a:srcRect/>
-          <a:stretch>
-            <a:fillRect/>
-          </a:stretch>
-        </a:blipFill>
-        <a:effectLst/>
-      </p:bgPr>
-    </p:bg>
     <p:spTree>
       <p:nvGrpSpPr>
         <p:cNvPr id="1" name=""/>
@@ -5655,7 +5636,7 @@
                     </a:schemeClr>
                   </a:solidFill>
                 </a:rPr>
-                <a:t>for(max = ToInt32(</a:t>
+                <a:t>for (max = ToInt32(</a:t>
               </a:r>
               <a:r>
                 <a:rPr lang="en-AU" sz="1600" dirty="0" err="1">
@@ -5700,6 +5681,16 @@
                 <a:buAutoNum type="arabicPeriod"/>
               </a:pPr>
               <a:r>
+                <a:rPr lang="en-AU" sz="1600">
+                  <a:solidFill>
+                    <a:schemeClr val="bg1">
+                      <a:lumMod val="65000"/>
+                    </a:schemeClr>
+                  </a:solidFill>
+                </a:rPr>
+                <a:t>    WriteLine</a:t>
+              </a:r>
+              <a:r>
                 <a:rPr lang="en-AU" sz="1600" dirty="0">
                   <a:solidFill>
                     <a:schemeClr val="bg1">
@@ -5707,7 +5698,7 @@
                     </a:schemeClr>
                   </a:solidFill>
                 </a:rPr>
-                <a:t>  WriteLine(max);</a:t>
+                <a:t>(max);</a:t>
               </a:r>
             </a:p>
             <a:p>
@@ -5773,7 +5764,7 @@
               <p:nvPr/>
             </p:nvPicPr>
             <p:blipFill>
-              <a:blip r:embed="rId3">
+              <a:blip r:embed="rId2">
                 <a:alphaModFix amt="30000"/>
               </a:blip>
               <a:stretch>
@@ -7593,7 +7584,7 @@
             <p:nvPr/>
           </p:nvPicPr>
           <p:blipFill>
-            <a:blip r:embed="rId4">
+            <a:blip r:embed="rId3">
               <a:alphaModFix/>
             </a:blip>
             <a:stretch>
@@ -8263,20 +8254,6 @@
 <file path=ppt/slides/slide2.xml><?xml version="1.0" encoding="utf-8"?>
 <p:sld xmlns:a="http://schemas.openxmlformats.org/drawingml/2006/main" xmlns:r="http://schemas.openxmlformats.org/officeDocument/2006/relationships" xmlns:p="http://schemas.openxmlformats.org/presentationml/2006/main">
   <p:cSld>
-    <p:bg>
-      <p:bgPr>
-        <a:blipFill dpi="0" rotWithShape="1">
-          <a:blip r:embed="rId2">
-            <a:lum/>
-          </a:blip>
-          <a:srcRect/>
-          <a:stretch>
-            <a:fillRect/>
-          </a:stretch>
-        </a:blipFill>
-        <a:effectLst/>
-      </p:bgPr>
-    </p:bg>
     <p:spTree>
       <p:nvGrpSpPr>
         <p:cNvPr id="1" name=""/>
@@ -8442,7 +8419,7 @@
               </a:pPr>
               <a:r>
                 <a:rPr lang="en-AU" sz="1600" dirty="0"/>
-                <a:t>for(</a:t>
+                <a:t>for (</a:t>
               </a:r>
               <a:r>
                 <a:rPr lang="en-AU" sz="1600" dirty="0">
@@ -8512,7 +8489,7 @@
                     </a:schemeClr>
                   </a:solidFill>
                 </a:rPr>
-                <a:t>  WriteLine(max);</a:t>
+                <a:t>    WriteLine(max);</a:t>
               </a:r>
             </a:p>
             <a:p>
@@ -8585,7 +8562,7 @@
               <p:nvPr/>
             </p:nvPicPr>
             <p:blipFill>
-              <a:blip r:embed="rId3">
+              <a:blip r:embed="rId2">
                 <a:alphaModFix amt="30000"/>
               </a:blip>
               <a:stretch>
@@ -10670,7 +10647,7 @@
             <p:nvPr/>
           </p:nvPicPr>
           <p:blipFill>
-            <a:blip r:embed="rId4">
+            <a:blip r:embed="rId3">
               <a:alphaModFix/>
             </a:blip>
             <a:stretch>
@@ -11095,20 +11072,6 @@
 <file path=ppt/slides/slide3.xml><?xml version="1.0" encoding="utf-8"?>
 <p:sld xmlns:a="http://schemas.openxmlformats.org/drawingml/2006/main" xmlns:r="http://schemas.openxmlformats.org/officeDocument/2006/relationships" xmlns:p="http://schemas.openxmlformats.org/presentationml/2006/main">
   <p:cSld>
-    <p:bg>
-      <p:bgPr>
-        <a:blipFill dpi="0" rotWithShape="1">
-          <a:blip r:embed="rId2">
-            <a:lum/>
-          </a:blip>
-          <a:srcRect/>
-          <a:stretch>
-            <a:fillRect/>
-          </a:stretch>
-        </a:blipFill>
-        <a:effectLst/>
-      </p:bgPr>
-    </p:bg>
     <p:spTree>
       <p:nvGrpSpPr>
         <p:cNvPr id="1" name=""/>
@@ -11266,7 +11229,7 @@
               </a:pPr>
               <a:r>
                 <a:rPr lang="en-AU" sz="1600" dirty="0"/>
-                <a:t>for(</a:t>
+                <a:t>for (</a:t>
               </a:r>
               <a:r>
                 <a:rPr lang="en-AU" sz="1600" dirty="0">
@@ -11350,7 +11313,7 @@
                     </a:schemeClr>
                   </a:solidFill>
                 </a:rPr>
-                <a:t>  WriteLine(max);</a:t>
+                <a:t>    WriteLine(max);</a:t>
               </a:r>
             </a:p>
             <a:p>
@@ -11423,7 +11386,7 @@
               <p:nvPr/>
             </p:nvPicPr>
             <p:blipFill>
-              <a:blip r:embed="rId3">
+              <a:blip r:embed="rId2">
                 <a:alphaModFix amt="30000"/>
               </a:blip>
               <a:stretch>
@@ -13519,7 +13482,7 @@
             <p:nvPr/>
           </p:nvPicPr>
           <p:blipFill>
-            <a:blip r:embed="rId4">
+            <a:blip r:embed="rId3">
               <a:alphaModFix amt="31000"/>
             </a:blip>
             <a:stretch>
@@ -13945,20 +13908,6 @@
 <file path=ppt/slides/slide4.xml><?xml version="1.0" encoding="utf-8"?>
 <p:sld xmlns:a="http://schemas.openxmlformats.org/drawingml/2006/main" xmlns:r="http://schemas.openxmlformats.org/officeDocument/2006/relationships" xmlns:p="http://schemas.openxmlformats.org/presentationml/2006/main">
   <p:cSld>
-    <p:bg>
-      <p:bgPr>
-        <a:blipFill dpi="0" rotWithShape="1">
-          <a:blip r:embed="rId2">
-            <a:lum/>
-          </a:blip>
-          <a:srcRect/>
-          <a:stretch>
-            <a:fillRect/>
-          </a:stretch>
-        </a:blipFill>
-        <a:effectLst/>
-      </p:bgPr>
-    </p:bg>
     <p:spTree>
       <p:nvGrpSpPr>
         <p:cNvPr id="1" name=""/>
@@ -14116,7 +14065,7 @@
                     </a:schemeClr>
                   </a:solidFill>
                 </a:rPr>
-                <a:t>for(max = ToInt32(</a:t>
+                <a:t>for (max = ToInt32(</a:t>
               </a:r>
               <a:r>
                 <a:rPr lang="en-AU" sz="1600" dirty="0" err="1">
@@ -14156,7 +14105,7 @@
               </a:pPr>
               <a:r>
                 <a:rPr lang="en-AU" sz="1600" dirty="0"/>
-                <a:t>  WriteLine(max);</a:t>
+                <a:t>    WriteLine(max);</a:t>
               </a:r>
             </a:p>
             <a:p>
@@ -14229,7 +14178,7 @@
               <p:nvPr/>
             </p:nvPicPr>
             <p:blipFill>
-              <a:blip r:embed="rId3">
+              <a:blip r:embed="rId2">
                 <a:alphaModFix amt="30000"/>
               </a:blip>
               <a:stretch>
@@ -16314,7 +16263,7 @@
             <p:nvPr/>
           </p:nvPicPr>
           <p:blipFill>
-            <a:blip r:embed="rId4">
+            <a:blip r:embed="rId3">
               <a:alphaModFix/>
             </a:blip>
             <a:stretch>
@@ -16739,20 +16688,6 @@
 <file path=ppt/slides/slide5.xml><?xml version="1.0" encoding="utf-8"?>
 <p:sld xmlns:a="http://schemas.openxmlformats.org/drawingml/2006/main" xmlns:r="http://schemas.openxmlformats.org/officeDocument/2006/relationships" xmlns:p="http://schemas.openxmlformats.org/presentationml/2006/main">
   <p:cSld>
-    <p:bg>
-      <p:bgPr>
-        <a:blipFill dpi="0" rotWithShape="1">
-          <a:blip r:embed="rId2">
-            <a:lum/>
-          </a:blip>
-          <a:srcRect/>
-          <a:stretch>
-            <a:fillRect/>
-          </a:stretch>
-        </a:blipFill>
-        <a:effectLst/>
-      </p:bgPr>
-    </p:bg>
     <p:spTree>
       <p:nvGrpSpPr>
         <p:cNvPr id="1" name=""/>
@@ -16916,7 +16851,7 @@
               </a:pPr>
               <a:r>
                 <a:rPr lang="en-AU" sz="1600" dirty="0"/>
-                <a:t>for(</a:t>
+                <a:t>for (</a:t>
               </a:r>
               <a:r>
                 <a:rPr lang="en-AU" sz="1600" dirty="0">
@@ -16990,7 +16925,7 @@
                     </a:schemeClr>
                   </a:solidFill>
                 </a:rPr>
-                <a:t>  WriteLine(max);</a:t>
+                <a:t>    WriteLine(max);</a:t>
               </a:r>
             </a:p>
             <a:p>
@@ -17063,7 +16998,7 @@
               <p:nvPr/>
             </p:nvPicPr>
             <p:blipFill>
-              <a:blip r:embed="rId3">
+              <a:blip r:embed="rId2">
                 <a:alphaModFix amt="30000"/>
               </a:blip>
               <a:stretch>
@@ -18623,23 +18558,23 @@
               <a:custGeom>
                 <a:avLst/>
                 <a:gdLst>
-                  <a:gd name="connsiteX0" fmla="*/ 0 w 1790958"/>
+                  <a:gd name="connsiteX0" fmla="*/ 0 w 2083055"/>
                   <a:gd name="connsiteY0" fmla="*/ 0 h 307777"/>
-                  <a:gd name="connsiteX1" fmla="*/ 579076 w 1790958"/>
+                  <a:gd name="connsiteX1" fmla="*/ 673521 w 2083055"/>
                   <a:gd name="connsiteY1" fmla="*/ 0 h 307777"/>
-                  <a:gd name="connsiteX2" fmla="*/ 1122334 w 1790958"/>
+                  <a:gd name="connsiteX2" fmla="*/ 1305381 w 2083055"/>
                   <a:gd name="connsiteY2" fmla="*/ 0 h 307777"/>
-                  <a:gd name="connsiteX3" fmla="*/ 1790958 w 1790958"/>
+                  <a:gd name="connsiteX3" fmla="*/ 2083055 w 2083055"/>
                   <a:gd name="connsiteY3" fmla="*/ 0 h 307777"/>
-                  <a:gd name="connsiteX4" fmla="*/ 1790958 w 1790958"/>
+                  <a:gd name="connsiteX4" fmla="*/ 2083055 w 2083055"/>
                   <a:gd name="connsiteY4" fmla="*/ 307777 h 307777"/>
-                  <a:gd name="connsiteX5" fmla="*/ 1229791 w 1790958"/>
+                  <a:gd name="connsiteX5" fmla="*/ 1430364 w 2083055"/>
                   <a:gd name="connsiteY5" fmla="*/ 307777 h 307777"/>
-                  <a:gd name="connsiteX6" fmla="*/ 596986 w 1790958"/>
+                  <a:gd name="connsiteX6" fmla="*/ 694352 w 2083055"/>
                   <a:gd name="connsiteY6" fmla="*/ 307777 h 307777"/>
-                  <a:gd name="connsiteX7" fmla="*/ 0 w 1790958"/>
+                  <a:gd name="connsiteX7" fmla="*/ 0 w 2083055"/>
                   <a:gd name="connsiteY7" fmla="*/ 307777 h 307777"/>
-                  <a:gd name="connsiteX8" fmla="*/ 0 w 1790958"/>
+                  <a:gd name="connsiteX8" fmla="*/ 0 w 2083055"/>
                   <a:gd name="connsiteY8" fmla="*/ 0 h 307777"/>
                 </a:gdLst>
                 <a:ahLst/>
@@ -18674,43 +18609,43 @@
                 </a:cxnLst>
                 <a:rect l="l" t="t" r="r" b="b"/>
                 <a:pathLst>
-                  <a:path w="1790958" h="307777" extrusionOk="0">
+                  <a:path w="2083055" h="307777" extrusionOk="0">
                     <a:moveTo>
                       <a:pt x="0" y="0"/>
                     </a:moveTo>
                     <a:cubicBezTo>
-                      <a:pt x="180129" y="-4056"/>
-                      <a:pt x="398353" y="25850"/>
-                      <a:pt x="579076" y="0"/>
-                    </a:cubicBezTo>
-                    <a:cubicBezTo>
-                      <a:pt x="759799" y="-25850"/>
-                      <a:pt x="981450" y="-12133"/>
-                      <a:pt x="1122334" y="0"/>
-                    </a:cubicBezTo>
-                    <a:cubicBezTo>
-                      <a:pt x="1263218" y="12133"/>
-                      <a:pt x="1483492" y="-11370"/>
-                      <a:pt x="1790958" y="0"/>
-                    </a:cubicBezTo>
-                    <a:cubicBezTo>
-                      <a:pt x="1796396" y="133970"/>
-                      <a:pt x="1786801" y="197125"/>
-                      <a:pt x="1790958" y="307777"/>
-                    </a:cubicBezTo>
-                    <a:cubicBezTo>
-                      <a:pt x="1528972" y="324931"/>
-                      <a:pt x="1412461" y="284823"/>
-                      <a:pt x="1229791" y="307777"/>
-                    </a:cubicBezTo>
-                    <a:cubicBezTo>
-                      <a:pt x="1047121" y="330731"/>
-                      <a:pt x="753824" y="323917"/>
-                      <a:pt x="596986" y="307777"/>
-                    </a:cubicBezTo>
-                    <a:cubicBezTo>
-                      <a:pt x="440148" y="291637"/>
-                      <a:pt x="272396" y="319813"/>
+                      <a:pt x="179522" y="-14549"/>
+                      <a:pt x="405857" y="33431"/>
+                      <a:pt x="673521" y="0"/>
+                    </a:cubicBezTo>
+                    <a:cubicBezTo>
+                      <a:pt x="941185" y="-33431"/>
+                      <a:pt x="1149279" y="-17056"/>
+                      <a:pt x="1305381" y="0"/>
+                    </a:cubicBezTo>
+                    <a:cubicBezTo>
+                      <a:pt x="1461483" y="17056"/>
+                      <a:pt x="1707323" y="-14310"/>
+                      <a:pt x="2083055" y="0"/>
+                    </a:cubicBezTo>
+                    <a:cubicBezTo>
+                      <a:pt x="2088493" y="133970"/>
+                      <a:pt x="2078898" y="197125"/>
+                      <a:pt x="2083055" y="307777"/>
+                    </a:cubicBezTo>
+                    <a:cubicBezTo>
+                      <a:pt x="1858530" y="275421"/>
+                      <a:pt x="1731412" y="303088"/>
+                      <a:pt x="1430364" y="307777"/>
+                    </a:cubicBezTo>
+                    <a:cubicBezTo>
+                      <a:pt x="1129316" y="312466"/>
+                      <a:pt x="1013911" y="285257"/>
+                      <a:pt x="694352" y="307777"/>
+                    </a:cubicBezTo>
+                    <a:cubicBezTo>
+                      <a:pt x="374793" y="330297"/>
+                      <a:pt x="147520" y="304123"/>
                       <a:pt x="0" y="307777"/>
                     </a:cubicBezTo>
                     <a:cubicBezTo>
@@ -19148,7 +19083,7 @@
             <p:nvPr/>
           </p:nvPicPr>
           <p:blipFill>
-            <a:blip r:embed="rId4">
+            <a:blip r:embed="rId3">
               <a:alphaModFix/>
             </a:blip>
             <a:stretch>
@@ -19638,20 +19573,6 @@
 <file path=ppt/slides/slide6.xml><?xml version="1.0" encoding="utf-8"?>
 <p:sld xmlns:a="http://schemas.openxmlformats.org/drawingml/2006/main" xmlns:r="http://schemas.openxmlformats.org/officeDocument/2006/relationships" xmlns:p="http://schemas.openxmlformats.org/presentationml/2006/main">
   <p:cSld>
-    <p:bg>
-      <p:bgPr>
-        <a:blipFill dpi="0" rotWithShape="1">
-          <a:blip r:embed="rId2">
-            <a:lum/>
-          </a:blip>
-          <a:srcRect/>
-          <a:stretch>
-            <a:fillRect/>
-          </a:stretch>
-        </a:blipFill>
-        <a:effectLst/>
-      </p:bgPr>
-    </p:bg>
     <p:spTree>
       <p:nvGrpSpPr>
         <p:cNvPr id="1" name=""/>
@@ -19809,7 +19730,7 @@
               </a:pPr>
               <a:r>
                 <a:rPr lang="en-AU" sz="1600" dirty="0"/>
-                <a:t>for(</a:t>
+                <a:t>for (</a:t>
               </a:r>
               <a:r>
                 <a:rPr lang="en-AU" sz="1600" dirty="0">
@@ -19893,7 +19814,7 @@
                     </a:schemeClr>
                   </a:solidFill>
                 </a:rPr>
-                <a:t>  WriteLine(max);</a:t>
+                <a:t>    WriteLine(max);</a:t>
               </a:r>
             </a:p>
             <a:p>
@@ -19966,7 +19887,7 @@
               <p:nvPr/>
             </p:nvPicPr>
             <p:blipFill>
-              <a:blip r:embed="rId3">
+              <a:blip r:embed="rId2">
                 <a:alphaModFix amt="30000"/>
               </a:blip>
               <a:stretch>
@@ -22062,7 +21983,7 @@
             <p:nvPr/>
           </p:nvPicPr>
           <p:blipFill>
-            <a:blip r:embed="rId4">
+            <a:blip r:embed="rId3">
               <a:alphaModFix amt="31000"/>
             </a:blip>
             <a:stretch>
@@ -22551,20 +22472,6 @@
 <file path=ppt/slides/slide7.xml><?xml version="1.0" encoding="utf-8"?>
 <p:sld xmlns:a="http://schemas.openxmlformats.org/drawingml/2006/main" xmlns:r="http://schemas.openxmlformats.org/officeDocument/2006/relationships" xmlns:p="http://schemas.openxmlformats.org/presentationml/2006/main">
   <p:cSld>
-    <p:bg>
-      <p:bgPr>
-        <a:blipFill dpi="0" rotWithShape="1">
-          <a:blip r:embed="rId2">
-            <a:lum/>
-          </a:blip>
-          <a:srcRect/>
-          <a:stretch>
-            <a:fillRect/>
-          </a:stretch>
-        </a:blipFill>
-        <a:effectLst/>
-      </p:bgPr>
-    </p:bg>
     <p:spTree>
       <p:nvGrpSpPr>
         <p:cNvPr id="1" name=""/>
@@ -22746,7 +22653,7 @@
                     </a:schemeClr>
                   </a:solidFill>
                 </a:rPr>
-                <a:t>for(max = ToInt32(</a:t>
+                <a:t>for (max = ToInt32(</a:t>
               </a:r>
               <a:r>
                 <a:rPr lang="en-AU" sz="1600" dirty="0" err="1">
@@ -22786,7 +22693,7 @@
               </a:pPr>
               <a:r>
                 <a:rPr lang="en-AU" sz="1600" dirty="0"/>
-                <a:t>  WriteLine(max);</a:t>
+                <a:t>    WriteLine(max);</a:t>
               </a:r>
             </a:p>
             <a:p>
@@ -22859,7 +22766,7 @@
               <p:nvPr/>
             </p:nvPicPr>
             <p:blipFill>
-              <a:blip r:embed="rId3">
+              <a:blip r:embed="rId2">
                 <a:alphaModFix amt="30000"/>
               </a:blip>
               <a:stretch>
@@ -24419,23 +24326,23 @@
               <a:custGeom>
                 <a:avLst/>
                 <a:gdLst>
-                  <a:gd name="connsiteX0" fmla="*/ 0 w 1790957"/>
+                  <a:gd name="connsiteX0" fmla="*/ 0 w 2083053"/>
                   <a:gd name="connsiteY0" fmla="*/ 0 h 307777"/>
-                  <a:gd name="connsiteX1" fmla="*/ 579076 w 1790957"/>
+                  <a:gd name="connsiteX1" fmla="*/ 673520 w 2083053"/>
                   <a:gd name="connsiteY1" fmla="*/ 0 h 307777"/>
-                  <a:gd name="connsiteX2" fmla="*/ 1122333 w 1790957"/>
+                  <a:gd name="connsiteX2" fmla="*/ 1305380 w 2083053"/>
                   <a:gd name="connsiteY2" fmla="*/ 0 h 307777"/>
-                  <a:gd name="connsiteX3" fmla="*/ 1790957 w 1790957"/>
+                  <a:gd name="connsiteX3" fmla="*/ 2083053 w 2083053"/>
                   <a:gd name="connsiteY3" fmla="*/ 0 h 307777"/>
-                  <a:gd name="connsiteX4" fmla="*/ 1790957 w 1790957"/>
+                  <a:gd name="connsiteX4" fmla="*/ 2083053 w 2083053"/>
                   <a:gd name="connsiteY4" fmla="*/ 307777 h 307777"/>
-                  <a:gd name="connsiteX5" fmla="*/ 1229790 w 1790957"/>
+                  <a:gd name="connsiteX5" fmla="*/ 1430363 w 2083053"/>
                   <a:gd name="connsiteY5" fmla="*/ 307777 h 307777"/>
-                  <a:gd name="connsiteX6" fmla="*/ 596986 w 1790957"/>
+                  <a:gd name="connsiteX6" fmla="*/ 694351 w 2083053"/>
                   <a:gd name="connsiteY6" fmla="*/ 307777 h 307777"/>
-                  <a:gd name="connsiteX7" fmla="*/ 0 w 1790957"/>
+                  <a:gd name="connsiteX7" fmla="*/ 0 w 2083053"/>
                   <a:gd name="connsiteY7" fmla="*/ 307777 h 307777"/>
-                  <a:gd name="connsiteX8" fmla="*/ 0 w 1790957"/>
+                  <a:gd name="connsiteX8" fmla="*/ 0 w 2083053"/>
                   <a:gd name="connsiteY8" fmla="*/ 0 h 307777"/>
                 </a:gdLst>
                 <a:ahLst/>
@@ -24470,43 +24377,43 @@
                 </a:cxnLst>
                 <a:rect l="l" t="t" r="r" b="b"/>
                 <a:pathLst>
-                  <a:path w="1790957" h="307777" extrusionOk="0">
+                  <a:path w="2083053" h="307777" extrusionOk="0">
                     <a:moveTo>
                       <a:pt x="0" y="0"/>
                     </a:moveTo>
                     <a:cubicBezTo>
-                      <a:pt x="180129" y="-4056"/>
-                      <a:pt x="398353" y="25850"/>
-                      <a:pt x="579076" y="0"/>
-                    </a:cubicBezTo>
-                    <a:cubicBezTo>
-                      <a:pt x="759799" y="-25850"/>
-                      <a:pt x="987342" y="-6784"/>
-                      <a:pt x="1122333" y="0"/>
-                    </a:cubicBezTo>
-                    <a:cubicBezTo>
-                      <a:pt x="1257324" y="6784"/>
-                      <a:pt x="1483491" y="-11370"/>
-                      <a:pt x="1790957" y="0"/>
-                    </a:cubicBezTo>
-                    <a:cubicBezTo>
-                      <a:pt x="1796395" y="133970"/>
-                      <a:pt x="1786800" y="197125"/>
-                      <a:pt x="1790957" y="307777"/>
-                    </a:cubicBezTo>
-                    <a:cubicBezTo>
-                      <a:pt x="1528971" y="324931"/>
-                      <a:pt x="1412460" y="284823"/>
-                      <a:pt x="1229790" y="307777"/>
-                    </a:cubicBezTo>
-                    <a:cubicBezTo>
-                      <a:pt x="1047120" y="330731"/>
-                      <a:pt x="751944" y="319249"/>
-                      <a:pt x="596986" y="307777"/>
-                    </a:cubicBezTo>
-                    <a:cubicBezTo>
-                      <a:pt x="442028" y="296305"/>
-                      <a:pt x="272396" y="319813"/>
+                      <a:pt x="181374" y="-12353"/>
+                      <a:pt x="408259" y="-29961"/>
+                      <a:pt x="673520" y="0"/>
+                    </a:cubicBezTo>
+                    <a:cubicBezTo>
+                      <a:pt x="938781" y="29961"/>
+                      <a:pt x="1149278" y="-17056"/>
+                      <a:pt x="1305380" y="0"/>
+                    </a:cubicBezTo>
+                    <a:cubicBezTo>
+                      <a:pt x="1461482" y="17056"/>
+                      <a:pt x="1709290" y="-9944"/>
+                      <a:pt x="2083053" y="0"/>
+                    </a:cubicBezTo>
+                    <a:cubicBezTo>
+                      <a:pt x="2088491" y="133970"/>
+                      <a:pt x="2078896" y="197125"/>
+                      <a:pt x="2083053" y="307777"/>
+                    </a:cubicBezTo>
+                    <a:cubicBezTo>
+                      <a:pt x="1856848" y="335618"/>
+                      <a:pt x="1726925" y="299114"/>
+                      <a:pt x="1430363" y="307777"/>
+                    </a:cubicBezTo>
+                    <a:cubicBezTo>
+                      <a:pt x="1133801" y="316441"/>
+                      <a:pt x="1013910" y="285257"/>
+                      <a:pt x="694351" y="307777"/>
+                    </a:cubicBezTo>
+                    <a:cubicBezTo>
+                      <a:pt x="374792" y="330297"/>
+                      <a:pt x="147466" y="302666"/>
                       <a:pt x="0" y="307777"/>
                     </a:cubicBezTo>
                     <a:cubicBezTo>
@@ -24944,7 +24851,7 @@
             <p:nvPr/>
           </p:nvPicPr>
           <p:blipFill>
-            <a:blip r:embed="rId4">
+            <a:blip r:embed="rId3">
               <a:alphaModFix/>
             </a:blip>
             <a:stretch>
@@ -25428,20 +25335,6 @@
 <file path=ppt/slides/slide8.xml><?xml version="1.0" encoding="utf-8"?>
 <p:sld xmlns:a="http://schemas.openxmlformats.org/drawingml/2006/main" xmlns:r="http://schemas.openxmlformats.org/officeDocument/2006/relationships" xmlns:p="http://schemas.openxmlformats.org/presentationml/2006/main">
   <p:cSld>
-    <p:bg>
-      <p:bgPr>
-        <a:blipFill dpi="0" rotWithShape="1">
-          <a:blip r:embed="rId2">
-            <a:lum/>
-          </a:blip>
-          <a:srcRect/>
-          <a:stretch>
-            <a:fillRect/>
-          </a:stretch>
-        </a:blipFill>
-        <a:effectLst/>
-      </p:bgPr>
-    </p:bg>
     <p:spTree>
       <p:nvGrpSpPr>
         <p:cNvPr id="1" name=""/>
@@ -25626,7 +25519,7 @@
               </a:pPr>
               <a:r>
                 <a:rPr lang="en-AU" sz="1600" dirty="0"/>
-                <a:t>for(</a:t>
+                <a:t>for (</a:t>
               </a:r>
               <a:r>
                 <a:rPr lang="en-AU" sz="1600" dirty="0">
@@ -25700,7 +25593,7 @@
                     </a:schemeClr>
                   </a:solidFill>
                 </a:rPr>
-                <a:t>  WriteLine(max);</a:t>
+                <a:t>    WriteLine(max);</a:t>
               </a:r>
             </a:p>
             <a:p>
@@ -25773,7 +25666,7 @@
               <p:nvPr/>
             </p:nvPicPr>
             <p:blipFill>
-              <a:blip r:embed="rId3">
+              <a:blip r:embed="rId2">
                 <a:alphaModFix amt="30000"/>
               </a:blip>
               <a:stretch>
@@ -27305,24 +27198,28 @@
               <a:custGeom>
                 <a:avLst/>
                 <a:gdLst>
-                  <a:gd name="connsiteX0" fmla="*/ 0 w 1910603"/>
+                  <a:gd name="connsiteX0" fmla="*/ 0 w 2222214"/>
                   <a:gd name="connsiteY0" fmla="*/ 0 h 307777"/>
-                  <a:gd name="connsiteX1" fmla="*/ 617762 w 1910603"/>
+                  <a:gd name="connsiteX1" fmla="*/ 533331 w 2222214"/>
                   <a:gd name="connsiteY1" fmla="*/ 0 h 307777"/>
-                  <a:gd name="connsiteX2" fmla="*/ 1197311 w 1910603"/>
+                  <a:gd name="connsiteX2" fmla="*/ 1022218 w 2222214"/>
                   <a:gd name="connsiteY2" fmla="*/ 0 h 307777"/>
-                  <a:gd name="connsiteX3" fmla="*/ 1910603 w 1910603"/>
+                  <a:gd name="connsiteX3" fmla="*/ 1622216 w 2222214"/>
                   <a:gd name="connsiteY3" fmla="*/ 0 h 307777"/>
-                  <a:gd name="connsiteX4" fmla="*/ 1910603 w 1910603"/>
-                  <a:gd name="connsiteY4" fmla="*/ 307777 h 307777"/>
-                  <a:gd name="connsiteX5" fmla="*/ 1311947 w 1910603"/>
+                  <a:gd name="connsiteX4" fmla="*/ 2222214 w 2222214"/>
+                  <a:gd name="connsiteY4" fmla="*/ 0 h 307777"/>
+                  <a:gd name="connsiteX5" fmla="*/ 2222214 w 2222214"/>
                   <a:gd name="connsiteY5" fmla="*/ 307777 h 307777"/>
-                  <a:gd name="connsiteX6" fmla="*/ 636868 w 1910603"/>
+                  <a:gd name="connsiteX6" fmla="*/ 1711105 w 2222214"/>
                   <a:gd name="connsiteY6" fmla="*/ 307777 h 307777"/>
-                  <a:gd name="connsiteX7" fmla="*/ 0 w 1910603"/>
+                  <a:gd name="connsiteX7" fmla="*/ 1199996 w 2222214"/>
                   <a:gd name="connsiteY7" fmla="*/ 307777 h 307777"/>
-                  <a:gd name="connsiteX8" fmla="*/ 0 w 1910603"/>
-                  <a:gd name="connsiteY8" fmla="*/ 0 h 307777"/>
+                  <a:gd name="connsiteX8" fmla="*/ 599998 w 2222214"/>
+                  <a:gd name="connsiteY8" fmla="*/ 307777 h 307777"/>
+                  <a:gd name="connsiteX9" fmla="*/ 0 w 2222214"/>
+                  <a:gd name="connsiteY9" fmla="*/ 307777 h 307777"/>
+                  <a:gd name="connsiteX10" fmla="*/ 0 w 2222214"/>
+                  <a:gd name="connsiteY10" fmla="*/ 0 h 307777"/>
                 </a:gdLst>
                 <a:ahLst/>
                 <a:cxnLst>
@@ -27353,51 +27250,67 @@
                   <a:cxn ang="0">
                     <a:pos x="connsiteX8" y="connsiteY8"/>
                   </a:cxn>
+                  <a:cxn ang="0">
+                    <a:pos x="connsiteX9" y="connsiteY9"/>
+                  </a:cxn>
+                  <a:cxn ang="0">
+                    <a:pos x="connsiteX10" y="connsiteY10"/>
+                  </a:cxn>
                 </a:cxnLst>
                 <a:rect l="l" t="t" r="r" b="b"/>
                 <a:pathLst>
-                  <a:path w="1910603" h="307777" extrusionOk="0">
+                  <a:path w="2222214" h="307777" extrusionOk="0">
                     <a:moveTo>
                       <a:pt x="0" y="0"/>
                     </a:moveTo>
                     <a:cubicBezTo>
-                      <a:pt x="233330" y="-22153"/>
-                      <a:pt x="356826" y="25841"/>
-                      <a:pt x="617762" y="0"/>
-                    </a:cubicBezTo>
-                    <a:cubicBezTo>
-                      <a:pt x="878698" y="-25841"/>
-                      <a:pt x="1077408" y="3521"/>
-                      <a:pt x="1197311" y="0"/>
-                    </a:cubicBezTo>
-                    <a:cubicBezTo>
-                      <a:pt x="1317214" y="-3521"/>
-                      <a:pt x="1608901" y="11482"/>
-                      <a:pt x="1910603" y="0"/>
-                    </a:cubicBezTo>
-                    <a:cubicBezTo>
-                      <a:pt x="1916041" y="133970"/>
-                      <a:pt x="1906446" y="197125"/>
-                      <a:pt x="1910603" y="307777"/>
-                    </a:cubicBezTo>
-                    <a:cubicBezTo>
-                      <a:pt x="1614974" y="304764"/>
-                      <a:pt x="1500224" y="336052"/>
-                      <a:pt x="1311947" y="307777"/>
-                    </a:cubicBezTo>
-                    <a:cubicBezTo>
-                      <a:pt x="1123670" y="279502"/>
-                      <a:pt x="879144" y="327016"/>
-                      <a:pt x="636868" y="307777"/>
-                    </a:cubicBezTo>
-                    <a:cubicBezTo>
-                      <a:pt x="394592" y="288538"/>
-                      <a:pt x="297176" y="318196"/>
+                      <a:pt x="172972" y="22324"/>
+                      <a:pt x="369643" y="-21492"/>
+                      <a:pt x="533331" y="0"/>
+                    </a:cubicBezTo>
+                    <a:cubicBezTo>
+                      <a:pt x="697019" y="21492"/>
+                      <a:pt x="778527" y="-1501"/>
+                      <a:pt x="1022218" y="0"/>
+                    </a:cubicBezTo>
+                    <a:cubicBezTo>
+                      <a:pt x="1265909" y="1501"/>
+                      <a:pt x="1494216" y="21737"/>
+                      <a:pt x="1622216" y="0"/>
+                    </a:cubicBezTo>
+                    <a:cubicBezTo>
+                      <a:pt x="1750216" y="-21737"/>
+                      <a:pt x="2102026" y="-20151"/>
+                      <a:pt x="2222214" y="0"/>
+                    </a:cubicBezTo>
+                    <a:cubicBezTo>
+                      <a:pt x="2226801" y="131595"/>
+                      <a:pt x="2216259" y="214584"/>
+                      <a:pt x="2222214" y="307777"/>
+                    </a:cubicBezTo>
+                    <a:cubicBezTo>
+                      <a:pt x="2061826" y="333296"/>
+                      <a:pt x="1853343" y="311786"/>
+                      <a:pt x="1711105" y="307777"/>
+                    </a:cubicBezTo>
+                    <a:cubicBezTo>
+                      <a:pt x="1568867" y="303768"/>
+                      <a:pt x="1437409" y="284327"/>
+                      <a:pt x="1199996" y="307777"/>
+                    </a:cubicBezTo>
+                    <a:cubicBezTo>
+                      <a:pt x="962583" y="331227"/>
+                      <a:pt x="723613" y="302568"/>
+                      <a:pt x="599998" y="307777"/>
+                    </a:cubicBezTo>
+                    <a:cubicBezTo>
+                      <a:pt x="476383" y="312986"/>
+                      <a:pt x="194204" y="288798"/>
                       <a:pt x="0" y="307777"/>
                     </a:cubicBezTo>
                     <a:cubicBezTo>
-                      <a:pt x="-6096" y="178844"/>
-                      <a:pt x="1978" y="79401"/>
+                      <a:pt x="11260" y="203020"/>
+                      <a:pt x="2767" y="111831"/>
                       <a:pt x="0" y="0"/>
                     </a:cubicBezTo>
                     <a:close/>
@@ -27830,7 +27743,7 @@
             <p:nvPr/>
           </p:nvPicPr>
           <p:blipFill>
-            <a:blip r:embed="rId4">
+            <a:blip r:embed="rId3">
               <a:alphaModFix amt="30000"/>
             </a:blip>
             <a:stretch>
@@ -28250,279 +28163,6 @@
           </a:fontRef>
         </p:style>
       </p:cxnSp>
-      <p:sp>
-        <p:nvSpPr>
-          <p:cNvPr id="33" name="Rectangle 32">
-            <a:extLst>
-              <a:ext uri="{FF2B5EF4-FFF2-40B4-BE49-F238E27FC236}">
-                <a16:creationId xmlns:a16="http://schemas.microsoft.com/office/drawing/2014/main" id="{D3903E04-6FC1-3025-6829-6157B17BE8B8}"/>
-              </a:ext>
-            </a:extLst>
-          </p:cNvPr>
-          <p:cNvSpPr/>
-          <p:nvPr/>
-        </p:nvSpPr>
-        <p:spPr>
-          <a:xfrm>
-            <a:off x="5101583" y="1867493"/>
-            <a:ext cx="2127795" cy="1234935"/>
-          </a:xfrm>
-          <a:custGeom>
-            <a:avLst/>
-            <a:gdLst>
-              <a:gd name="connsiteX0" fmla="*/ 0 w 2127795"/>
-              <a:gd name="connsiteY0" fmla="*/ 0 h 1234935"/>
-              <a:gd name="connsiteX1" fmla="*/ 510671 w 2127795"/>
-              <a:gd name="connsiteY1" fmla="*/ 0 h 1234935"/>
-              <a:gd name="connsiteX2" fmla="*/ 1042620 w 2127795"/>
-              <a:gd name="connsiteY2" fmla="*/ 0 h 1234935"/>
-              <a:gd name="connsiteX3" fmla="*/ 1595846 w 2127795"/>
-              <a:gd name="connsiteY3" fmla="*/ 0 h 1234935"/>
-              <a:gd name="connsiteX4" fmla="*/ 2127795 w 2127795"/>
-              <a:gd name="connsiteY4" fmla="*/ 0 h 1234935"/>
-              <a:gd name="connsiteX5" fmla="*/ 2127795 w 2127795"/>
-              <a:gd name="connsiteY5" fmla="*/ 629817 h 1234935"/>
-              <a:gd name="connsiteX6" fmla="*/ 2127795 w 2127795"/>
-              <a:gd name="connsiteY6" fmla="*/ 1234935 h 1234935"/>
-              <a:gd name="connsiteX7" fmla="*/ 1553290 w 2127795"/>
-              <a:gd name="connsiteY7" fmla="*/ 1234935 h 1234935"/>
-              <a:gd name="connsiteX8" fmla="*/ 978786 w 2127795"/>
-              <a:gd name="connsiteY8" fmla="*/ 1234935 h 1234935"/>
-              <a:gd name="connsiteX9" fmla="*/ 0 w 2127795"/>
-              <a:gd name="connsiteY9" fmla="*/ 1234935 h 1234935"/>
-              <a:gd name="connsiteX10" fmla="*/ 0 w 2127795"/>
-              <a:gd name="connsiteY10" fmla="*/ 629817 h 1234935"/>
-              <a:gd name="connsiteX11" fmla="*/ 0 w 2127795"/>
-              <a:gd name="connsiteY11" fmla="*/ 0 h 1234935"/>
-            </a:gdLst>
-            <a:ahLst/>
-            <a:cxnLst>
-              <a:cxn ang="0">
-                <a:pos x="connsiteX0" y="connsiteY0"/>
-              </a:cxn>
-              <a:cxn ang="0">
-                <a:pos x="connsiteX1" y="connsiteY1"/>
-              </a:cxn>
-              <a:cxn ang="0">
-                <a:pos x="connsiteX2" y="connsiteY2"/>
-              </a:cxn>
-              <a:cxn ang="0">
-                <a:pos x="connsiteX3" y="connsiteY3"/>
-              </a:cxn>
-              <a:cxn ang="0">
-                <a:pos x="connsiteX4" y="connsiteY4"/>
-              </a:cxn>
-              <a:cxn ang="0">
-                <a:pos x="connsiteX5" y="connsiteY5"/>
-              </a:cxn>
-              <a:cxn ang="0">
-                <a:pos x="connsiteX6" y="connsiteY6"/>
-              </a:cxn>
-              <a:cxn ang="0">
-                <a:pos x="connsiteX7" y="connsiteY7"/>
-              </a:cxn>
-              <a:cxn ang="0">
-                <a:pos x="connsiteX8" y="connsiteY8"/>
-              </a:cxn>
-              <a:cxn ang="0">
-                <a:pos x="connsiteX9" y="connsiteY9"/>
-              </a:cxn>
-              <a:cxn ang="0">
-                <a:pos x="connsiteX10" y="connsiteY10"/>
-              </a:cxn>
-              <a:cxn ang="0">
-                <a:pos x="connsiteX11" y="connsiteY11"/>
-              </a:cxn>
-            </a:cxnLst>
-            <a:rect l="l" t="t" r="r" b="b"/>
-            <a:pathLst>
-              <a:path w="2127795" h="1234935" fill="none" extrusionOk="0">
-                <a:moveTo>
-                  <a:pt x="0" y="0"/>
-                </a:moveTo>
-                <a:cubicBezTo>
-                  <a:pt x="119302" y="-23815"/>
-                  <a:pt x="321953" y="-4268"/>
-                  <a:pt x="510671" y="0"/>
-                </a:cubicBezTo>
-                <a:cubicBezTo>
-                  <a:pt x="699389" y="4268"/>
-                  <a:pt x="838038" y="-4296"/>
-                  <a:pt x="1042620" y="0"/>
-                </a:cubicBezTo>
-                <a:cubicBezTo>
-                  <a:pt x="1247202" y="4296"/>
-                  <a:pt x="1418238" y="-20161"/>
-                  <a:pt x="1595846" y="0"/>
-                </a:cubicBezTo>
-                <a:cubicBezTo>
-                  <a:pt x="1773454" y="20161"/>
-                  <a:pt x="1930348" y="288"/>
-                  <a:pt x="2127795" y="0"/>
-                </a:cubicBezTo>
-                <a:cubicBezTo>
-                  <a:pt x="2157931" y="299914"/>
-                  <a:pt x="2132405" y="354606"/>
-                  <a:pt x="2127795" y="629817"/>
-                </a:cubicBezTo>
-                <a:cubicBezTo>
-                  <a:pt x="2123185" y="905028"/>
-                  <a:pt x="2121256" y="1110594"/>
-                  <a:pt x="2127795" y="1234935"/>
-                </a:cubicBezTo>
-                <a:cubicBezTo>
-                  <a:pt x="1890946" y="1251567"/>
-                  <a:pt x="1709293" y="1231838"/>
-                  <a:pt x="1553290" y="1234935"/>
-                </a:cubicBezTo>
-                <a:cubicBezTo>
-                  <a:pt x="1397287" y="1238032"/>
-                  <a:pt x="1242166" y="1239590"/>
-                  <a:pt x="978786" y="1234935"/>
-                </a:cubicBezTo>
-                <a:cubicBezTo>
-                  <a:pt x="715406" y="1230280"/>
-                  <a:pt x="281211" y="1234762"/>
-                  <a:pt x="0" y="1234935"/>
-                </a:cubicBezTo>
-                <a:cubicBezTo>
-                  <a:pt x="24760" y="1016687"/>
-                  <a:pt x="-16769" y="890304"/>
-                  <a:pt x="0" y="629817"/>
-                </a:cubicBezTo>
-                <a:cubicBezTo>
-                  <a:pt x="16769" y="369330"/>
-                  <a:pt x="14535" y="154799"/>
-                  <a:pt x="0" y="0"/>
-                </a:cubicBezTo>
-                <a:close/>
-              </a:path>
-              <a:path w="2127795" h="1234935" stroke="0" extrusionOk="0">
-                <a:moveTo>
-                  <a:pt x="0" y="0"/>
-                </a:moveTo>
-                <a:cubicBezTo>
-                  <a:pt x="171248" y="-8495"/>
-                  <a:pt x="325453" y="21877"/>
-                  <a:pt x="510671" y="0"/>
-                </a:cubicBezTo>
-                <a:cubicBezTo>
-                  <a:pt x="695889" y="-21877"/>
-                  <a:pt x="802356" y="-16277"/>
-                  <a:pt x="978786" y="0"/>
-                </a:cubicBezTo>
-                <a:cubicBezTo>
-                  <a:pt x="1155217" y="16277"/>
-                  <a:pt x="1321550" y="15209"/>
-                  <a:pt x="1553290" y="0"/>
-                </a:cubicBezTo>
-                <a:cubicBezTo>
-                  <a:pt x="1785030" y="-15209"/>
-                  <a:pt x="1999571" y="-24705"/>
-                  <a:pt x="2127795" y="0"/>
-                </a:cubicBezTo>
-                <a:cubicBezTo>
-                  <a:pt x="2115851" y="174757"/>
-                  <a:pt x="2100076" y="443170"/>
-                  <a:pt x="2127795" y="605118"/>
-                </a:cubicBezTo>
-                <a:cubicBezTo>
-                  <a:pt x="2155514" y="767066"/>
-                  <a:pt x="2134161" y="1036723"/>
-                  <a:pt x="2127795" y="1234935"/>
-                </a:cubicBezTo>
-                <a:cubicBezTo>
-                  <a:pt x="1970448" y="1216625"/>
-                  <a:pt x="1767058" y="1224671"/>
-                  <a:pt x="1595846" y="1234935"/>
-                </a:cubicBezTo>
-                <a:cubicBezTo>
-                  <a:pt x="1424634" y="1245199"/>
-                  <a:pt x="1144488" y="1230558"/>
-                  <a:pt x="1021342" y="1234935"/>
-                </a:cubicBezTo>
-                <a:cubicBezTo>
-                  <a:pt x="898196" y="1239312"/>
-                  <a:pt x="704334" y="1223412"/>
-                  <a:pt x="553227" y="1234935"/>
-                </a:cubicBezTo>
-                <a:cubicBezTo>
-                  <a:pt x="402121" y="1246458"/>
-                  <a:pt x="151220" y="1245336"/>
-                  <a:pt x="0" y="1234935"/>
-                </a:cubicBezTo>
-                <a:cubicBezTo>
-                  <a:pt x="13954" y="933914"/>
-                  <a:pt x="-64" y="841436"/>
-                  <a:pt x="0" y="617468"/>
-                </a:cubicBezTo>
-                <a:cubicBezTo>
-                  <a:pt x="64" y="393500"/>
-                  <a:pt x="4866" y="238355"/>
-                  <a:pt x="0" y="0"/>
-                </a:cubicBezTo>
-                <a:close/>
-              </a:path>
-            </a:pathLst>
-          </a:custGeom>
-          <a:solidFill>
-            <a:schemeClr val="accent4">
-              <a:lumMod val="60000"/>
-              <a:lumOff val="40000"/>
-            </a:schemeClr>
-          </a:solidFill>
-          <a:ln w="12700">
-            <a:solidFill>
-              <a:schemeClr val="tx1"/>
-            </a:solidFill>
-            <a:extLst>
-              <a:ext uri="{C807C97D-BFC1-408E-A445-0C87EB9F89A2}">
-                <ask:lineSketchStyleProps xmlns:ask="http://schemas.microsoft.com/office/drawing/2018/sketchyshapes" sd="1219033472">
-                  <a:prstGeom prst="rect">
-                    <a:avLst/>
-                  </a:prstGeom>
-                  <ask:type>
-                    <ask:lineSketchFreehand/>
-                  </ask:type>
-                </ask:lineSketchStyleProps>
-              </a:ext>
-            </a:extLst>
-          </a:ln>
-          <a:effectLst/>
-        </p:spPr>
-        <p:style>
-          <a:lnRef idx="1">
-            <a:schemeClr val="accent4"/>
-          </a:lnRef>
-          <a:fillRef idx="2">
-            <a:schemeClr val="accent4"/>
-          </a:fillRef>
-          <a:effectRef idx="1">
-            <a:schemeClr val="accent4"/>
-          </a:effectRef>
-          <a:fontRef idx="minor">
-            <a:schemeClr val="dk1"/>
-          </a:fontRef>
-        </p:style>
-        <p:txBody>
-          <a:bodyPr rtlCol="0" anchor="ctr"/>
-          <a:lstStyle/>
-          <a:p>
-            <a:pPr algn="ctr"/>
-            <a:r>
-              <a:rPr lang="en-US" sz="1600" dirty="0"/>
-              <a:t>Let’s jump ahead: </a:t>
-            </a:r>
-            <a:br>
-              <a:rPr lang="en-US" sz="1600" dirty="0"/>
-            </a:br>
-            <a:r>
-              <a:rPr lang="en-US" sz="1600" dirty="0"/>
-              <a:t>3,2 and 1 have been printed and the counter is back at 3c </a:t>
-            </a:r>
-          </a:p>
-        </p:txBody>
-      </p:sp>
       <p:cxnSp>
         <p:nvCxnSpPr>
           <p:cNvPr id="43" name="Straight Connector 42">
@@ -28634,20 +28274,6 @@
 <file path=ppt/slides/slide9.xml><?xml version="1.0" encoding="utf-8"?>
 <p:sld xmlns:a="http://schemas.openxmlformats.org/drawingml/2006/main" xmlns:r="http://schemas.openxmlformats.org/officeDocument/2006/relationships" xmlns:p="http://schemas.openxmlformats.org/presentationml/2006/main">
   <p:cSld>
-    <p:bg>
-      <p:bgPr>
-        <a:blipFill dpi="0" rotWithShape="1">
-          <a:blip r:embed="rId2">
-            <a:lum/>
-          </a:blip>
-          <a:srcRect/>
-          <a:stretch>
-            <a:fillRect/>
-          </a:stretch>
-        </a:blipFill>
-        <a:effectLst/>
-      </p:bgPr>
-    </p:bg>
     <p:spTree>
       <p:nvGrpSpPr>
         <p:cNvPr id="1" name=""/>
@@ -28764,7 +28390,7 @@
               </a:pPr>
               <a:r>
                 <a:rPr lang="en-AU" sz="1600" dirty="0"/>
-                <a:t>for(</a:t>
+                <a:t>for (</a:t>
               </a:r>
               <a:r>
                 <a:rPr lang="en-AU" sz="1600" dirty="0">
@@ -28848,7 +28474,7 @@
                     </a:schemeClr>
                   </a:solidFill>
                 </a:rPr>
-                <a:t>  WriteLine(max);</a:t>
+                <a:t>    WriteLine(max);</a:t>
               </a:r>
             </a:p>
             <a:p>
@@ -28921,7 +28547,7 @@
               <p:nvPr/>
             </p:nvPicPr>
             <p:blipFill>
-              <a:blip r:embed="rId3">
+              <a:blip r:embed="rId2">
                 <a:alphaModFix amt="30000"/>
               </a:blip>
               <a:stretch>
@@ -30795,7 +30421,7 @@
             <p:nvPr/>
           </p:nvPicPr>
           <p:blipFill>
-            <a:blip r:embed="rId4">
+            <a:blip r:embed="rId3">
               <a:alphaModFix amt="31000"/>
             </a:blip>
             <a:stretch>

</xml_diff>